<commit_message>
Rephrase multiple teams to tech orga
</commit_message>
<xml_diff>
--- a/charts/charts.pptx
+++ b/charts/charts.pptx
@@ -216,7 +216,7 @@
           <a:p>
             <a:fld id="{511DBF38-111F-4C48-93F4-B65DF8B44846}" type="datetimeFigureOut">
               <a:rPr lang="en-US" smtClean="0"/>
-              <a:t>7/6/20</a:t>
+              <a:t>7/2/21</a:t>
             </a:fld>
             <a:endParaRPr lang="en-US"/>
           </a:p>
@@ -612,7 +612,7 @@
           <a:p>
             <a:fld id="{37B1D8A3-40A5-CC46-B346-36758DE6AE04}" type="datetimeFigureOut">
               <a:rPr lang="en-US" smtClean="0"/>
-              <a:t>7/6/20</a:t>
+              <a:t>7/2/21</a:t>
             </a:fld>
             <a:endParaRPr lang="en-US"/>
           </a:p>
@@ -780,7 +780,7 @@
           <a:p>
             <a:fld id="{37B1D8A3-40A5-CC46-B346-36758DE6AE04}" type="datetimeFigureOut">
               <a:rPr lang="en-US" smtClean="0"/>
-              <a:t>7/6/20</a:t>
+              <a:t>7/2/21</a:t>
             </a:fld>
             <a:endParaRPr lang="en-US"/>
           </a:p>
@@ -958,7 +958,7 @@
           <a:p>
             <a:fld id="{37B1D8A3-40A5-CC46-B346-36758DE6AE04}" type="datetimeFigureOut">
               <a:rPr lang="en-US" smtClean="0"/>
-              <a:t>7/6/20</a:t>
+              <a:t>7/2/21</a:t>
             </a:fld>
             <a:endParaRPr lang="en-US"/>
           </a:p>
@@ -1126,7 +1126,7 @@
           <a:p>
             <a:fld id="{37B1D8A3-40A5-CC46-B346-36758DE6AE04}" type="datetimeFigureOut">
               <a:rPr lang="en-US" smtClean="0"/>
-              <a:t>7/6/20</a:t>
+              <a:t>7/2/21</a:t>
             </a:fld>
             <a:endParaRPr lang="en-US"/>
           </a:p>
@@ -1371,7 +1371,7 @@
           <a:p>
             <a:fld id="{37B1D8A3-40A5-CC46-B346-36758DE6AE04}" type="datetimeFigureOut">
               <a:rPr lang="en-US" smtClean="0"/>
-              <a:t>7/6/20</a:t>
+              <a:t>7/2/21</a:t>
             </a:fld>
             <a:endParaRPr lang="en-US"/>
           </a:p>
@@ -1600,7 +1600,7 @@
           <a:p>
             <a:fld id="{37B1D8A3-40A5-CC46-B346-36758DE6AE04}" type="datetimeFigureOut">
               <a:rPr lang="en-US" smtClean="0"/>
-              <a:t>7/6/20</a:t>
+              <a:t>7/2/21</a:t>
             </a:fld>
             <a:endParaRPr lang="en-US"/>
           </a:p>
@@ -1964,7 +1964,7 @@
           <a:p>
             <a:fld id="{37B1D8A3-40A5-CC46-B346-36758DE6AE04}" type="datetimeFigureOut">
               <a:rPr lang="en-US" smtClean="0"/>
-              <a:t>7/6/20</a:t>
+              <a:t>7/2/21</a:t>
             </a:fld>
             <a:endParaRPr lang="en-US"/>
           </a:p>
@@ -2081,7 +2081,7 @@
           <a:p>
             <a:fld id="{37B1D8A3-40A5-CC46-B346-36758DE6AE04}" type="datetimeFigureOut">
               <a:rPr lang="en-US" smtClean="0"/>
-              <a:t>7/6/20</a:t>
+              <a:t>7/2/21</a:t>
             </a:fld>
             <a:endParaRPr lang="en-US"/>
           </a:p>
@@ -2176,7 +2176,7 @@
           <a:p>
             <a:fld id="{37B1D8A3-40A5-CC46-B346-36758DE6AE04}" type="datetimeFigureOut">
               <a:rPr lang="en-US" smtClean="0"/>
-              <a:t>7/6/20</a:t>
+              <a:t>7/2/21</a:t>
             </a:fld>
             <a:endParaRPr lang="en-US"/>
           </a:p>
@@ -2451,7 +2451,7 @@
           <a:p>
             <a:fld id="{37B1D8A3-40A5-CC46-B346-36758DE6AE04}" type="datetimeFigureOut">
               <a:rPr lang="en-US" smtClean="0"/>
-              <a:t>7/6/20</a:t>
+              <a:t>7/2/21</a:t>
             </a:fld>
             <a:endParaRPr lang="en-US"/>
           </a:p>
@@ -2703,7 +2703,7 @@
           <a:p>
             <a:fld id="{37B1D8A3-40A5-CC46-B346-36758DE6AE04}" type="datetimeFigureOut">
               <a:rPr lang="en-US" smtClean="0"/>
-              <a:t>7/6/20</a:t>
+              <a:t>7/2/21</a:t>
             </a:fld>
             <a:endParaRPr lang="en-US"/>
           </a:p>
@@ -2914,7 +2914,7 @@
           <a:p>
             <a:fld id="{37B1D8A3-40A5-CC46-B346-36758DE6AE04}" type="datetimeFigureOut">
               <a:rPr lang="en-US" smtClean="0"/>
-              <a:t>7/6/20</a:t>
+              <a:t>7/2/21</a:t>
             </a:fld>
             <a:endParaRPr lang="en-US"/>
           </a:p>
@@ -4553,29 +4553,30 @@
             <p:spPr>
               <a:xfrm>
                 <a:off x="4498988" y="2598752"/>
-                <a:ext cx="745717" cy="461665"/>
-              </a:xfrm>
-              <a:prstGeom prst="rect">
-                <a:avLst/>
-              </a:prstGeom>
-              <a:noFill/>
-            </p:spPr>
-            <p:txBody>
-              <a:bodyPr wrap="none" rtlCol="0">
-                <a:spAutoFit/>
-              </a:bodyPr>
-              <a:lstStyle/>
-              <a:p>
-                <a:r>
-                  <a:rPr lang="en-US" sz="1200"/>
-                  <a:t>Multiple </a:t>
-                </a:r>
-              </a:p>
-              <a:p>
-                <a:r>
-                  <a:rPr lang="en-US" sz="1200" dirty="0"/>
-                  <a:t>Teams</a:t>
-                </a:r>
+                <a:ext cx="504433" cy="461665"/>
+              </a:xfrm>
+              <a:prstGeom prst="rect">
+                <a:avLst/>
+              </a:prstGeom>
+              <a:noFill/>
+            </p:spPr>
+            <p:txBody>
+              <a:bodyPr wrap="none" rtlCol="0">
+                <a:spAutoFit/>
+              </a:bodyPr>
+              <a:lstStyle/>
+              <a:p>
+                <a:r>
+                  <a:rPr lang="en-US" sz="1200" dirty="0"/>
+                  <a:t>Tech </a:t>
+                </a:r>
+              </a:p>
+              <a:p>
+                <a:r>
+                  <a:rPr lang="en-US" sz="1200" dirty="0" err="1"/>
+                  <a:t>Orga</a:t>
+                </a:r>
+                <a:endParaRPr lang="en-US" sz="1200" dirty="0"/>
               </a:p>
             </p:txBody>
           </p:sp>
@@ -6232,29 +6233,30 @@
             <p:spPr>
               <a:xfrm>
                 <a:off x="4498988" y="2598752"/>
-                <a:ext cx="745717" cy="461665"/>
-              </a:xfrm>
-              <a:prstGeom prst="rect">
-                <a:avLst/>
-              </a:prstGeom>
-              <a:noFill/>
-            </p:spPr>
-            <p:txBody>
-              <a:bodyPr wrap="none" rtlCol="0">
-                <a:spAutoFit/>
-              </a:bodyPr>
-              <a:lstStyle/>
-              <a:p>
-                <a:r>
-                  <a:rPr lang="en-US" sz="1200"/>
-                  <a:t>Multiple </a:t>
-                </a:r>
-              </a:p>
-              <a:p>
-                <a:r>
-                  <a:rPr lang="en-US" sz="1200" dirty="0"/>
-                  <a:t>Teams</a:t>
-                </a:r>
+                <a:ext cx="504433" cy="461665"/>
+              </a:xfrm>
+              <a:prstGeom prst="rect">
+                <a:avLst/>
+              </a:prstGeom>
+              <a:noFill/>
+            </p:spPr>
+            <p:txBody>
+              <a:bodyPr wrap="none" rtlCol="0">
+                <a:spAutoFit/>
+              </a:bodyPr>
+              <a:lstStyle/>
+              <a:p>
+                <a:r>
+                  <a:rPr lang="en-US" sz="1200" dirty="0"/>
+                  <a:t>Tech </a:t>
+                </a:r>
+              </a:p>
+              <a:p>
+                <a:r>
+                  <a:rPr lang="en-US" sz="1200" dirty="0" err="1"/>
+                  <a:t>Orga</a:t>
+                </a:r>
+                <a:endParaRPr lang="en-US" sz="1200" dirty="0"/>
               </a:p>
             </p:txBody>
           </p:sp>
@@ -7905,29 +7907,30 @@
             <p:spPr>
               <a:xfrm>
                 <a:off x="4498988" y="2598752"/>
-                <a:ext cx="745717" cy="461665"/>
-              </a:xfrm>
-              <a:prstGeom prst="rect">
-                <a:avLst/>
-              </a:prstGeom>
-              <a:noFill/>
-            </p:spPr>
-            <p:txBody>
-              <a:bodyPr wrap="none" rtlCol="0">
-                <a:spAutoFit/>
-              </a:bodyPr>
-              <a:lstStyle/>
-              <a:p>
-                <a:r>
-                  <a:rPr lang="en-US" sz="1200"/>
-                  <a:t>Multiple </a:t>
-                </a:r>
-              </a:p>
-              <a:p>
-                <a:r>
-                  <a:rPr lang="en-US" sz="1200" dirty="0"/>
-                  <a:t>Teams</a:t>
-                </a:r>
+                <a:ext cx="504433" cy="461665"/>
+              </a:xfrm>
+              <a:prstGeom prst="rect">
+                <a:avLst/>
+              </a:prstGeom>
+              <a:noFill/>
+            </p:spPr>
+            <p:txBody>
+              <a:bodyPr wrap="none" rtlCol="0">
+                <a:spAutoFit/>
+              </a:bodyPr>
+              <a:lstStyle/>
+              <a:p>
+                <a:r>
+                  <a:rPr lang="en-US" sz="1200" dirty="0"/>
+                  <a:t>Tech </a:t>
+                </a:r>
+              </a:p>
+              <a:p>
+                <a:r>
+                  <a:rPr lang="en-US" sz="1200" dirty="0" err="1"/>
+                  <a:t>Orga</a:t>
+                </a:r>
+                <a:endParaRPr lang="en-US" sz="1200" dirty="0"/>
               </a:p>
             </p:txBody>
           </p:sp>
@@ -9565,7 +9568,7 @@
           <p:spPr>
             <a:xfrm>
               <a:off x="4498988" y="2598752"/>
-              <a:ext cx="745717" cy="461665"/>
+              <a:ext cx="504433" cy="461665"/>
             </a:xfrm>
             <a:prstGeom prst="rect">
               <a:avLst/>
@@ -9579,15 +9582,16 @@
             <a:lstStyle/>
             <a:p>
               <a:r>
-                <a:rPr lang="en-US" sz="1200"/>
-                <a:t>Multiple </a:t>
+                <a:rPr lang="en-US" sz="1200" dirty="0"/>
+                <a:t>Tech </a:t>
               </a:r>
             </a:p>
             <a:p>
               <a:r>
-                <a:rPr lang="en-US" sz="1200" dirty="0"/>
-                <a:t>Teams</a:t>
+                <a:rPr lang="en-US" sz="1200" dirty="0" err="1"/>
+                <a:t>Orga</a:t>
               </a:r>
+              <a:endParaRPr lang="en-US" sz="1200" dirty="0"/>
             </a:p>
           </p:txBody>
         </p:sp>
@@ -11237,29 +11241,30 @@
             <p:spPr>
               <a:xfrm>
                 <a:off x="4498988" y="2598752"/>
-                <a:ext cx="745717" cy="461665"/>
-              </a:xfrm>
-              <a:prstGeom prst="rect">
-                <a:avLst/>
-              </a:prstGeom>
-              <a:noFill/>
-            </p:spPr>
-            <p:txBody>
-              <a:bodyPr wrap="none" rtlCol="0">
-                <a:spAutoFit/>
-              </a:bodyPr>
-              <a:lstStyle/>
-              <a:p>
-                <a:r>
-                  <a:rPr lang="en-US" sz="1200"/>
-                  <a:t>Multiple </a:t>
-                </a:r>
-              </a:p>
-              <a:p>
-                <a:r>
-                  <a:rPr lang="en-US" sz="1200" dirty="0"/>
-                  <a:t>Teams</a:t>
-                </a:r>
+                <a:ext cx="504433" cy="461665"/>
+              </a:xfrm>
+              <a:prstGeom prst="rect">
+                <a:avLst/>
+              </a:prstGeom>
+              <a:noFill/>
+            </p:spPr>
+            <p:txBody>
+              <a:bodyPr wrap="none" rtlCol="0">
+                <a:spAutoFit/>
+              </a:bodyPr>
+              <a:lstStyle/>
+              <a:p>
+                <a:r>
+                  <a:rPr lang="en-US" sz="1200" dirty="0"/>
+                  <a:t>Tech </a:t>
+                </a:r>
+              </a:p>
+              <a:p>
+                <a:r>
+                  <a:rPr lang="en-US" sz="1200" dirty="0" err="1"/>
+                  <a:t>Orga</a:t>
+                </a:r>
+                <a:endParaRPr lang="en-US" sz="1200" dirty="0"/>
               </a:p>
             </p:txBody>
           </p:sp>
@@ -12915,29 +12920,30 @@
             <p:spPr>
               <a:xfrm>
                 <a:off x="4498988" y="2598752"/>
-                <a:ext cx="745717" cy="461665"/>
-              </a:xfrm>
-              <a:prstGeom prst="rect">
-                <a:avLst/>
-              </a:prstGeom>
-              <a:noFill/>
-            </p:spPr>
-            <p:txBody>
-              <a:bodyPr wrap="none" rtlCol="0">
-                <a:spAutoFit/>
-              </a:bodyPr>
-              <a:lstStyle/>
-              <a:p>
-                <a:r>
-                  <a:rPr lang="en-US" sz="1200"/>
-                  <a:t>Multiple </a:t>
-                </a:r>
-              </a:p>
-              <a:p>
-                <a:r>
-                  <a:rPr lang="en-US" sz="1200" dirty="0"/>
-                  <a:t>Teams</a:t>
-                </a:r>
+                <a:ext cx="504433" cy="461665"/>
+              </a:xfrm>
+              <a:prstGeom prst="rect">
+                <a:avLst/>
+              </a:prstGeom>
+              <a:noFill/>
+            </p:spPr>
+            <p:txBody>
+              <a:bodyPr wrap="none" rtlCol="0">
+                <a:spAutoFit/>
+              </a:bodyPr>
+              <a:lstStyle/>
+              <a:p>
+                <a:r>
+                  <a:rPr lang="en-US" sz="1200" dirty="0"/>
+                  <a:t>Tech </a:t>
+                </a:r>
+              </a:p>
+              <a:p>
+                <a:r>
+                  <a:rPr lang="en-US" sz="1200" dirty="0" err="1"/>
+                  <a:t>Orga</a:t>
+                </a:r>
+                <a:endParaRPr lang="en-US" sz="1200" dirty="0"/>
               </a:p>
             </p:txBody>
           </p:sp>
@@ -14589,29 +14595,30 @@
             <p:spPr>
               <a:xfrm>
                 <a:off x="4498988" y="2598752"/>
-                <a:ext cx="745717" cy="461665"/>
-              </a:xfrm>
-              <a:prstGeom prst="rect">
-                <a:avLst/>
-              </a:prstGeom>
-              <a:noFill/>
-            </p:spPr>
-            <p:txBody>
-              <a:bodyPr wrap="none" rtlCol="0">
-                <a:spAutoFit/>
-              </a:bodyPr>
-              <a:lstStyle/>
-              <a:p>
-                <a:r>
-                  <a:rPr lang="en-US" sz="1200"/>
-                  <a:t>Multiple </a:t>
-                </a:r>
-              </a:p>
-              <a:p>
-                <a:r>
-                  <a:rPr lang="en-US" sz="1200" dirty="0"/>
-                  <a:t>Teams</a:t>
-                </a:r>
+                <a:ext cx="504433" cy="461665"/>
+              </a:xfrm>
+              <a:prstGeom prst="rect">
+                <a:avLst/>
+              </a:prstGeom>
+              <a:noFill/>
+            </p:spPr>
+            <p:txBody>
+              <a:bodyPr wrap="none" rtlCol="0">
+                <a:spAutoFit/>
+              </a:bodyPr>
+              <a:lstStyle/>
+              <a:p>
+                <a:r>
+                  <a:rPr lang="en-US" sz="1200" dirty="0"/>
+                  <a:t>Tech </a:t>
+                </a:r>
+              </a:p>
+              <a:p>
+                <a:r>
+                  <a:rPr lang="en-US" sz="1200" dirty="0" err="1"/>
+                  <a:t>Orga</a:t>
+                </a:r>
+                <a:endParaRPr lang="en-US" sz="1200" dirty="0"/>
               </a:p>
             </p:txBody>
           </p:sp>
@@ -16278,29 +16285,30 @@
             <p:spPr>
               <a:xfrm>
                 <a:off x="4498988" y="2598752"/>
-                <a:ext cx="745717" cy="461665"/>
-              </a:xfrm>
-              <a:prstGeom prst="rect">
-                <a:avLst/>
-              </a:prstGeom>
-              <a:noFill/>
-            </p:spPr>
-            <p:txBody>
-              <a:bodyPr wrap="none" rtlCol="0">
-                <a:spAutoFit/>
-              </a:bodyPr>
-              <a:lstStyle/>
-              <a:p>
-                <a:r>
-                  <a:rPr lang="en-US" sz="1200"/>
-                  <a:t>Multiple </a:t>
-                </a:r>
-              </a:p>
-              <a:p>
-                <a:r>
-                  <a:rPr lang="en-US" sz="1200" dirty="0"/>
-                  <a:t>Teams</a:t>
-                </a:r>
+                <a:ext cx="504433" cy="461665"/>
+              </a:xfrm>
+              <a:prstGeom prst="rect">
+                <a:avLst/>
+              </a:prstGeom>
+              <a:noFill/>
+            </p:spPr>
+            <p:txBody>
+              <a:bodyPr wrap="none" rtlCol="0">
+                <a:spAutoFit/>
+              </a:bodyPr>
+              <a:lstStyle/>
+              <a:p>
+                <a:r>
+                  <a:rPr lang="en-US" sz="1200" dirty="0"/>
+                  <a:t>Tech </a:t>
+                </a:r>
+              </a:p>
+              <a:p>
+                <a:r>
+                  <a:rPr lang="en-US" sz="1200" dirty="0" err="1"/>
+                  <a:t>Orga</a:t>
+                </a:r>
+                <a:endParaRPr lang="en-US" sz="1200" dirty="0"/>
               </a:p>
             </p:txBody>
           </p:sp>
@@ -17966,29 +17974,30 @@
             <p:spPr>
               <a:xfrm>
                 <a:off x="4498988" y="2598752"/>
-                <a:ext cx="745717" cy="461665"/>
-              </a:xfrm>
-              <a:prstGeom prst="rect">
-                <a:avLst/>
-              </a:prstGeom>
-              <a:noFill/>
-            </p:spPr>
-            <p:txBody>
-              <a:bodyPr wrap="none" rtlCol="0">
-                <a:spAutoFit/>
-              </a:bodyPr>
-              <a:lstStyle/>
-              <a:p>
-                <a:r>
-                  <a:rPr lang="en-US" sz="1200"/>
-                  <a:t>Multiple </a:t>
-                </a:r>
-              </a:p>
-              <a:p>
-                <a:r>
-                  <a:rPr lang="en-US" sz="1200" dirty="0"/>
-                  <a:t>Teams</a:t>
-                </a:r>
+                <a:ext cx="504433" cy="461665"/>
+              </a:xfrm>
+              <a:prstGeom prst="rect">
+                <a:avLst/>
+              </a:prstGeom>
+              <a:noFill/>
+            </p:spPr>
+            <p:txBody>
+              <a:bodyPr wrap="none" rtlCol="0">
+                <a:spAutoFit/>
+              </a:bodyPr>
+              <a:lstStyle/>
+              <a:p>
+                <a:r>
+                  <a:rPr lang="en-US" sz="1200" dirty="0"/>
+                  <a:t>Tech </a:t>
+                </a:r>
+              </a:p>
+              <a:p>
+                <a:r>
+                  <a:rPr lang="en-US" sz="1200" dirty="0" err="1"/>
+                  <a:t>Orga</a:t>
+                </a:r>
+                <a:endParaRPr lang="en-US" sz="1200" dirty="0"/>
               </a:p>
             </p:txBody>
           </p:sp>
@@ -19652,29 +19661,30 @@
             <p:spPr>
               <a:xfrm>
                 <a:off x="4498988" y="2598752"/>
-                <a:ext cx="745717" cy="461665"/>
-              </a:xfrm>
-              <a:prstGeom prst="rect">
-                <a:avLst/>
-              </a:prstGeom>
-              <a:noFill/>
-            </p:spPr>
-            <p:txBody>
-              <a:bodyPr wrap="none" rtlCol="0">
-                <a:spAutoFit/>
-              </a:bodyPr>
-              <a:lstStyle/>
-              <a:p>
-                <a:r>
-                  <a:rPr lang="en-US" sz="1200"/>
-                  <a:t>Multiple </a:t>
-                </a:r>
-              </a:p>
-              <a:p>
-                <a:r>
-                  <a:rPr lang="en-US" sz="1200" dirty="0"/>
-                  <a:t>Teams</a:t>
-                </a:r>
+                <a:ext cx="504433" cy="461665"/>
+              </a:xfrm>
+              <a:prstGeom prst="rect">
+                <a:avLst/>
+              </a:prstGeom>
+              <a:noFill/>
+            </p:spPr>
+            <p:txBody>
+              <a:bodyPr wrap="none" rtlCol="0">
+                <a:spAutoFit/>
+              </a:bodyPr>
+              <a:lstStyle/>
+              <a:p>
+                <a:r>
+                  <a:rPr lang="en-US" sz="1200" dirty="0"/>
+                  <a:t>Tech </a:t>
+                </a:r>
+              </a:p>
+              <a:p>
+                <a:r>
+                  <a:rPr lang="en-US" sz="1200" dirty="0" err="1"/>
+                  <a:t>Orga</a:t>
+                </a:r>
+                <a:endParaRPr lang="en-US" sz="1200" dirty="0"/>
               </a:p>
             </p:txBody>
           </p:sp>
@@ -21080,7 +21090,7 @@
           <p:spPr>
             <a:xfrm>
               <a:off x="4498988" y="2598752"/>
-              <a:ext cx="745717" cy="461665"/>
+              <a:ext cx="504433" cy="461665"/>
             </a:xfrm>
             <a:prstGeom prst="rect">
               <a:avLst/>
@@ -21094,15 +21104,16 @@
             <a:lstStyle/>
             <a:p>
               <a:r>
-                <a:rPr lang="en-US" sz="1200"/>
-                <a:t>Multiple </a:t>
+                <a:rPr lang="en-US" sz="1200" dirty="0"/>
+                <a:t>Tech </a:t>
               </a:r>
             </a:p>
             <a:p>
               <a:r>
-                <a:rPr lang="en-US" sz="1200" dirty="0"/>
-                <a:t>Teams</a:t>
+                <a:rPr lang="en-US" sz="1200" dirty="0" err="1"/>
+                <a:t>Orga</a:t>
               </a:r>
+              <a:endParaRPr lang="en-US" sz="1200" dirty="0"/>
             </a:p>
           </p:txBody>
         </p:sp>
@@ -22765,29 +22776,30 @@
             <p:spPr>
               <a:xfrm>
                 <a:off x="4498988" y="2598752"/>
-                <a:ext cx="745717" cy="461665"/>
-              </a:xfrm>
-              <a:prstGeom prst="rect">
-                <a:avLst/>
-              </a:prstGeom>
-              <a:noFill/>
-            </p:spPr>
-            <p:txBody>
-              <a:bodyPr wrap="none" rtlCol="0">
-                <a:spAutoFit/>
-              </a:bodyPr>
-              <a:lstStyle/>
-              <a:p>
-                <a:r>
-                  <a:rPr lang="en-US" sz="1200"/>
-                  <a:t>Multiple </a:t>
-                </a:r>
-              </a:p>
-              <a:p>
-                <a:r>
-                  <a:rPr lang="en-US" sz="1200" dirty="0"/>
-                  <a:t>Teams</a:t>
-                </a:r>
+                <a:ext cx="504433" cy="461665"/>
+              </a:xfrm>
+              <a:prstGeom prst="rect">
+                <a:avLst/>
+              </a:prstGeom>
+              <a:noFill/>
+            </p:spPr>
+            <p:txBody>
+              <a:bodyPr wrap="none" rtlCol="0">
+                <a:spAutoFit/>
+              </a:bodyPr>
+              <a:lstStyle/>
+              <a:p>
+                <a:r>
+                  <a:rPr lang="en-US" sz="1200" dirty="0"/>
+                  <a:t>Tech </a:t>
+                </a:r>
+              </a:p>
+              <a:p>
+                <a:r>
+                  <a:rPr lang="en-US" sz="1200" dirty="0" err="1"/>
+                  <a:t>Orga</a:t>
+                </a:r>
+                <a:endParaRPr lang="en-US" sz="1200" dirty="0"/>
               </a:p>
             </p:txBody>
           </p:sp>
@@ -24438,29 +24450,30 @@
             <p:spPr>
               <a:xfrm>
                 <a:off x="4498988" y="2598752"/>
-                <a:ext cx="745717" cy="461665"/>
-              </a:xfrm>
-              <a:prstGeom prst="rect">
-                <a:avLst/>
-              </a:prstGeom>
-              <a:noFill/>
-            </p:spPr>
-            <p:txBody>
-              <a:bodyPr wrap="none" rtlCol="0">
-                <a:spAutoFit/>
-              </a:bodyPr>
-              <a:lstStyle/>
-              <a:p>
-                <a:r>
-                  <a:rPr lang="en-US" sz="1200"/>
-                  <a:t>Multiple </a:t>
-                </a:r>
-              </a:p>
-              <a:p>
-                <a:r>
-                  <a:rPr lang="en-US" sz="1200" dirty="0"/>
-                  <a:t>Teams</a:t>
-                </a:r>
+                <a:ext cx="504433" cy="461665"/>
+              </a:xfrm>
+              <a:prstGeom prst="rect">
+                <a:avLst/>
+              </a:prstGeom>
+              <a:noFill/>
+            </p:spPr>
+            <p:txBody>
+              <a:bodyPr wrap="none" rtlCol="0">
+                <a:spAutoFit/>
+              </a:bodyPr>
+              <a:lstStyle/>
+              <a:p>
+                <a:r>
+                  <a:rPr lang="en-US" sz="1200" dirty="0"/>
+                  <a:t>Tech </a:t>
+                </a:r>
+              </a:p>
+              <a:p>
+                <a:r>
+                  <a:rPr lang="en-US" sz="1200" dirty="0" err="1"/>
+                  <a:t>Orga</a:t>
+                </a:r>
+                <a:endParaRPr lang="en-US" sz="1200" dirty="0"/>
               </a:p>
             </p:txBody>
           </p:sp>
@@ -26111,29 +26124,30 @@
             <p:spPr>
               <a:xfrm>
                 <a:off x="4498988" y="2598752"/>
-                <a:ext cx="745717" cy="461665"/>
-              </a:xfrm>
-              <a:prstGeom prst="rect">
-                <a:avLst/>
-              </a:prstGeom>
-              <a:noFill/>
-            </p:spPr>
-            <p:txBody>
-              <a:bodyPr wrap="none" rtlCol="0">
-                <a:spAutoFit/>
-              </a:bodyPr>
-              <a:lstStyle/>
-              <a:p>
-                <a:r>
-                  <a:rPr lang="en-US" sz="1200"/>
-                  <a:t>Multiple </a:t>
-                </a:r>
-              </a:p>
-              <a:p>
-                <a:r>
-                  <a:rPr lang="en-US" sz="1200" dirty="0"/>
-                  <a:t>Teams</a:t>
-                </a:r>
+                <a:ext cx="504433" cy="461665"/>
+              </a:xfrm>
+              <a:prstGeom prst="rect">
+                <a:avLst/>
+              </a:prstGeom>
+              <a:noFill/>
+            </p:spPr>
+            <p:txBody>
+              <a:bodyPr wrap="none" rtlCol="0">
+                <a:spAutoFit/>
+              </a:bodyPr>
+              <a:lstStyle/>
+              <a:p>
+                <a:r>
+                  <a:rPr lang="en-US" sz="1200" dirty="0"/>
+                  <a:t>Tech </a:t>
+                </a:r>
+              </a:p>
+              <a:p>
+                <a:r>
+                  <a:rPr lang="en-US" sz="1200" dirty="0" err="1"/>
+                  <a:t>Orga</a:t>
+                </a:r>
+                <a:endParaRPr lang="en-US" sz="1200" dirty="0"/>
               </a:p>
             </p:txBody>
           </p:sp>
@@ -27782,29 +27796,30 @@
             <p:spPr>
               <a:xfrm>
                 <a:off x="4498988" y="2598752"/>
-                <a:ext cx="745717" cy="461665"/>
-              </a:xfrm>
-              <a:prstGeom prst="rect">
-                <a:avLst/>
-              </a:prstGeom>
-              <a:noFill/>
-            </p:spPr>
-            <p:txBody>
-              <a:bodyPr wrap="none" rtlCol="0">
-                <a:spAutoFit/>
-              </a:bodyPr>
-              <a:lstStyle/>
-              <a:p>
-                <a:r>
-                  <a:rPr lang="en-US" sz="1200"/>
-                  <a:t>Multiple </a:t>
-                </a:r>
-              </a:p>
-              <a:p>
-                <a:r>
-                  <a:rPr lang="en-US" sz="1200" dirty="0"/>
-                  <a:t>Teams</a:t>
-                </a:r>
+                <a:ext cx="504433" cy="461665"/>
+              </a:xfrm>
+              <a:prstGeom prst="rect">
+                <a:avLst/>
+              </a:prstGeom>
+              <a:noFill/>
+            </p:spPr>
+            <p:txBody>
+              <a:bodyPr wrap="none" rtlCol="0">
+                <a:spAutoFit/>
+              </a:bodyPr>
+              <a:lstStyle/>
+              <a:p>
+                <a:r>
+                  <a:rPr lang="en-US" sz="1200" dirty="0"/>
+                  <a:t>Tech </a:t>
+                </a:r>
+              </a:p>
+              <a:p>
+                <a:r>
+                  <a:rPr lang="en-US" sz="1200" dirty="0" err="1"/>
+                  <a:t>Orga</a:t>
+                </a:r>
+                <a:endParaRPr lang="en-US" sz="1200" dirty="0"/>
               </a:p>
             </p:txBody>
           </p:sp>
@@ -29456,29 +29471,30 @@
             <p:spPr>
               <a:xfrm>
                 <a:off x="4498988" y="2598752"/>
-                <a:ext cx="745717" cy="461665"/>
-              </a:xfrm>
-              <a:prstGeom prst="rect">
-                <a:avLst/>
-              </a:prstGeom>
-              <a:noFill/>
-            </p:spPr>
-            <p:txBody>
-              <a:bodyPr wrap="none" rtlCol="0">
-                <a:spAutoFit/>
-              </a:bodyPr>
-              <a:lstStyle/>
-              <a:p>
-                <a:r>
-                  <a:rPr lang="en-US" sz="1200"/>
-                  <a:t>Multiple </a:t>
-                </a:r>
-              </a:p>
-              <a:p>
-                <a:r>
-                  <a:rPr lang="en-US" sz="1200" dirty="0"/>
-                  <a:t>Teams</a:t>
-                </a:r>
+                <a:ext cx="504433" cy="461665"/>
+              </a:xfrm>
+              <a:prstGeom prst="rect">
+                <a:avLst/>
+              </a:prstGeom>
+              <a:noFill/>
+            </p:spPr>
+            <p:txBody>
+              <a:bodyPr wrap="none" rtlCol="0">
+                <a:spAutoFit/>
+              </a:bodyPr>
+              <a:lstStyle/>
+              <a:p>
+                <a:r>
+                  <a:rPr lang="en-US" sz="1200" dirty="0"/>
+                  <a:t>Tech </a:t>
+                </a:r>
+              </a:p>
+              <a:p>
+                <a:r>
+                  <a:rPr lang="en-US" sz="1200" dirty="0" err="1"/>
+                  <a:t>Orga</a:t>
+                </a:r>
+                <a:endParaRPr lang="en-US" sz="1200" dirty="0"/>
               </a:p>
             </p:txBody>
           </p:sp>
@@ -31130,29 +31146,30 @@
             <p:spPr>
               <a:xfrm>
                 <a:off x="4498988" y="2598752"/>
-                <a:ext cx="745717" cy="461665"/>
-              </a:xfrm>
-              <a:prstGeom prst="rect">
-                <a:avLst/>
-              </a:prstGeom>
-              <a:noFill/>
-            </p:spPr>
-            <p:txBody>
-              <a:bodyPr wrap="none" rtlCol="0">
-                <a:spAutoFit/>
-              </a:bodyPr>
-              <a:lstStyle/>
-              <a:p>
-                <a:r>
-                  <a:rPr lang="en-US" sz="1200"/>
-                  <a:t>Multiple </a:t>
-                </a:r>
-              </a:p>
-              <a:p>
-                <a:r>
-                  <a:rPr lang="en-US" sz="1200" dirty="0"/>
-                  <a:t>Teams</a:t>
-                </a:r>
+                <a:ext cx="504433" cy="461665"/>
+              </a:xfrm>
+              <a:prstGeom prst="rect">
+                <a:avLst/>
+              </a:prstGeom>
+              <a:noFill/>
+            </p:spPr>
+            <p:txBody>
+              <a:bodyPr wrap="none" rtlCol="0">
+                <a:spAutoFit/>
+              </a:bodyPr>
+              <a:lstStyle/>
+              <a:p>
+                <a:r>
+                  <a:rPr lang="en-US" sz="1200" dirty="0"/>
+                  <a:t>Tech </a:t>
+                </a:r>
+              </a:p>
+              <a:p>
+                <a:r>
+                  <a:rPr lang="en-US" sz="1200" dirty="0" err="1"/>
+                  <a:t>Orga</a:t>
+                </a:r>
+                <a:endParaRPr lang="en-US" sz="1200" dirty="0"/>
               </a:p>
             </p:txBody>
           </p:sp>
@@ -32803,29 +32820,30 @@
             <p:spPr>
               <a:xfrm>
                 <a:off x="4498988" y="2598752"/>
-                <a:ext cx="745717" cy="461665"/>
-              </a:xfrm>
-              <a:prstGeom prst="rect">
-                <a:avLst/>
-              </a:prstGeom>
-              <a:noFill/>
-            </p:spPr>
-            <p:txBody>
-              <a:bodyPr wrap="none" rtlCol="0">
-                <a:spAutoFit/>
-              </a:bodyPr>
-              <a:lstStyle/>
-              <a:p>
-                <a:r>
-                  <a:rPr lang="en-US" sz="1200"/>
-                  <a:t>Multiple </a:t>
-                </a:r>
-              </a:p>
-              <a:p>
-                <a:r>
-                  <a:rPr lang="en-US" sz="1200" dirty="0"/>
-                  <a:t>Teams</a:t>
-                </a:r>
+                <a:ext cx="504433" cy="461665"/>
+              </a:xfrm>
+              <a:prstGeom prst="rect">
+                <a:avLst/>
+              </a:prstGeom>
+              <a:noFill/>
+            </p:spPr>
+            <p:txBody>
+              <a:bodyPr wrap="none" rtlCol="0">
+                <a:spAutoFit/>
+              </a:bodyPr>
+              <a:lstStyle/>
+              <a:p>
+                <a:r>
+                  <a:rPr lang="en-US" sz="1200" dirty="0"/>
+                  <a:t>Tech </a:t>
+                </a:r>
+              </a:p>
+              <a:p>
+                <a:r>
+                  <a:rPr lang="en-US" sz="1200" dirty="0" err="1"/>
+                  <a:t>Orga</a:t>
+                </a:r>
+                <a:endParaRPr lang="en-US" sz="1200" dirty="0"/>
               </a:p>
             </p:txBody>
           </p:sp>
@@ -34478,29 +34496,30 @@
             <p:spPr>
               <a:xfrm>
                 <a:off x="4498988" y="2598752"/>
-                <a:ext cx="745717" cy="461665"/>
-              </a:xfrm>
-              <a:prstGeom prst="rect">
-                <a:avLst/>
-              </a:prstGeom>
-              <a:noFill/>
-            </p:spPr>
-            <p:txBody>
-              <a:bodyPr wrap="none" rtlCol="0">
-                <a:spAutoFit/>
-              </a:bodyPr>
-              <a:lstStyle/>
-              <a:p>
-                <a:r>
-                  <a:rPr lang="en-US" sz="1200"/>
-                  <a:t>Multiple </a:t>
-                </a:r>
-              </a:p>
-              <a:p>
-                <a:r>
-                  <a:rPr lang="en-US" sz="1200" dirty="0"/>
-                  <a:t>Teams</a:t>
-                </a:r>
+                <a:ext cx="504433" cy="461665"/>
+              </a:xfrm>
+              <a:prstGeom prst="rect">
+                <a:avLst/>
+              </a:prstGeom>
+              <a:noFill/>
+            </p:spPr>
+            <p:txBody>
+              <a:bodyPr wrap="none" rtlCol="0">
+                <a:spAutoFit/>
+              </a:bodyPr>
+              <a:lstStyle/>
+              <a:p>
+                <a:r>
+                  <a:rPr lang="en-US" sz="1200" dirty="0"/>
+                  <a:t>Tech </a:t>
+                </a:r>
+              </a:p>
+              <a:p>
+                <a:r>
+                  <a:rPr lang="en-US" sz="1200" dirty="0" err="1"/>
+                  <a:t>Orga</a:t>
+                </a:r>
+                <a:endParaRPr lang="en-US" sz="1200" dirty="0"/>
               </a:p>
             </p:txBody>
           </p:sp>

</xml_diff>